<commit_message>
Making URLs links in the PPT
</commit_message>
<xml_diff>
--- a/IntroductoryTalkTemplate/Showcasing Orchard Core CMS.pptx
+++ b/IntroductoryTalkTemplate/Showcasing Orchard Core CMS.pptx
@@ -17,10 +17,10 @@
     <p:sldId id="263" r:id="rId8"/>
     <p:sldId id="265" r:id="rId9"/>
     <p:sldId id="264" r:id="rId10"/>
-    <p:sldId id="266" r:id="rId11"/>
+    <p:sldId id="271" r:id="rId11"/>
     <p:sldId id="267" r:id="rId12"/>
-    <p:sldId id="268" r:id="rId13"/>
-    <p:sldId id="269" r:id="rId14"/>
+    <p:sldId id="272" r:id="rId13"/>
+    <p:sldId id="273" r:id="rId14"/>
     <p:sldId id="270" r:id="rId15"/>
   </p:sldIdLst>
   <p:sldSz cx="12192000" cy="6858000"/>
@@ -262,7 +262,7 @@
           <a:p>
             <a:fld id="{E4359F16-E075-46EA-9430-278A6D2F0D2B}" type="datetimeFigureOut">
               <a:rPr lang="en-US" smtClean="0"/>
-              <a:t>5/9/2023</a:t>
+              <a:t>5/16/2023</a:t>
             </a:fld>
             <a:endParaRPr lang="en-US"/>
           </a:p>
@@ -1835,7 +1835,7 @@
           <a:p>
             <a:fld id="{20A66C5D-9C61-42DD-99EE-FB9C623F065C}" type="datetimeFigureOut">
               <a:rPr lang="en-US" smtClean="0"/>
-              <a:t>5/9/2023</a:t>
+              <a:t>5/16/2023</a:t>
             </a:fld>
             <a:endParaRPr lang="en-US"/>
           </a:p>
@@ -2033,7 +2033,7 @@
           <a:p>
             <a:fld id="{20A66C5D-9C61-42DD-99EE-FB9C623F065C}" type="datetimeFigureOut">
               <a:rPr lang="en-US" smtClean="0"/>
-              <a:t>5/9/2023</a:t>
+              <a:t>5/16/2023</a:t>
             </a:fld>
             <a:endParaRPr lang="en-US"/>
           </a:p>
@@ -2241,7 +2241,7 @@
           <a:p>
             <a:fld id="{20A66C5D-9C61-42DD-99EE-FB9C623F065C}" type="datetimeFigureOut">
               <a:rPr lang="en-US" smtClean="0"/>
-              <a:t>5/9/2023</a:t>
+              <a:t>5/16/2023</a:t>
             </a:fld>
             <a:endParaRPr lang="en-US"/>
           </a:p>
@@ -2439,7 +2439,7 @@
           <a:p>
             <a:fld id="{20A66C5D-9C61-42DD-99EE-FB9C623F065C}" type="datetimeFigureOut">
               <a:rPr lang="en-US" smtClean="0"/>
-              <a:t>5/9/2023</a:t>
+              <a:t>5/16/2023</a:t>
             </a:fld>
             <a:endParaRPr lang="en-US"/>
           </a:p>
@@ -2714,7 +2714,7 @@
           <a:p>
             <a:fld id="{20A66C5D-9C61-42DD-99EE-FB9C623F065C}" type="datetimeFigureOut">
               <a:rPr lang="en-US" smtClean="0"/>
-              <a:t>5/9/2023</a:t>
+              <a:t>5/16/2023</a:t>
             </a:fld>
             <a:endParaRPr lang="en-US"/>
           </a:p>
@@ -2979,7 +2979,7 @@
           <a:p>
             <a:fld id="{20A66C5D-9C61-42DD-99EE-FB9C623F065C}" type="datetimeFigureOut">
               <a:rPr lang="en-US" smtClean="0"/>
-              <a:t>5/9/2023</a:t>
+              <a:t>5/16/2023</a:t>
             </a:fld>
             <a:endParaRPr lang="en-US"/>
           </a:p>
@@ -3391,7 +3391,7 @@
           <a:p>
             <a:fld id="{20A66C5D-9C61-42DD-99EE-FB9C623F065C}" type="datetimeFigureOut">
               <a:rPr lang="en-US" smtClean="0"/>
-              <a:t>5/9/2023</a:t>
+              <a:t>5/16/2023</a:t>
             </a:fld>
             <a:endParaRPr lang="en-US"/>
           </a:p>
@@ -3532,7 +3532,7 @@
           <a:p>
             <a:fld id="{20A66C5D-9C61-42DD-99EE-FB9C623F065C}" type="datetimeFigureOut">
               <a:rPr lang="en-US" smtClean="0"/>
-              <a:t>5/9/2023</a:t>
+              <a:t>5/16/2023</a:t>
             </a:fld>
             <a:endParaRPr lang="en-US"/>
           </a:p>
@@ -3645,7 +3645,7 @@
           <a:p>
             <a:fld id="{20A66C5D-9C61-42DD-99EE-FB9C623F065C}" type="datetimeFigureOut">
               <a:rPr lang="en-US" smtClean="0"/>
-              <a:t>5/9/2023</a:t>
+              <a:t>5/16/2023</a:t>
             </a:fld>
             <a:endParaRPr lang="en-US"/>
           </a:p>
@@ -3956,7 +3956,7 @@
           <a:p>
             <a:fld id="{20A66C5D-9C61-42DD-99EE-FB9C623F065C}" type="datetimeFigureOut">
               <a:rPr lang="en-US" smtClean="0"/>
-              <a:t>5/9/2023</a:t>
+              <a:t>5/16/2023</a:t>
             </a:fld>
             <a:endParaRPr lang="en-US"/>
           </a:p>
@@ -4244,7 +4244,7 @@
           <a:p>
             <a:fld id="{20A66C5D-9C61-42DD-99EE-FB9C623F065C}" type="datetimeFigureOut">
               <a:rPr lang="en-US" smtClean="0"/>
-              <a:t>5/9/2023</a:t>
+              <a:t>5/16/2023</a:t>
             </a:fld>
             <a:endParaRPr lang="en-US"/>
           </a:p>
@@ -4485,7 +4485,7 @@
           <a:p>
             <a:fld id="{20A66C5D-9C61-42DD-99EE-FB9C623F065C}" type="datetimeFigureOut">
               <a:rPr lang="en-US" smtClean="0"/>
-              <a:t>5/9/2023</a:t>
+              <a:t>5/16/2023</a:t>
             </a:fld>
             <a:endParaRPr lang="en-US"/>
           </a:p>
@@ -5048,50 +5048,78 @@
           <a:lstStyle/>
           <a:p>
             <a:r>
+              <a:rPr lang="en-US" dirty="0">
+                <a:hlinkClick r:id="rId3"/>
+              </a:rPr>
+              <a:t>https://www.playtfr.com/</a:t>
+            </a:r>
+            <a:endParaRPr lang="en-US" dirty="0"/>
+          </a:p>
+          <a:p>
+            <a:r>
+              <a:rPr lang="en-US" dirty="0">
+                <a:hlinkClick r:id="rId4"/>
+              </a:rPr>
+              <a:t>https://www.rvc.ac.uk/</a:t>
+            </a:r>
+          </a:p>
+          <a:p>
+            <a:r>
+              <a:rPr lang="en-US" dirty="0">
+                <a:hlinkClick r:id="rId4"/>
+              </a:rPr>
+              <a:t>https://fly.eg/</a:t>
+            </a:r>
+          </a:p>
+          <a:p>
+            <a:r>
+              <a:rPr lang="en-US" dirty="0">
+                <a:hlinkClick r:id="rId4"/>
+              </a:rPr>
+              <a:t>https://www.houseofblues.com/</a:t>
+            </a:r>
+          </a:p>
+          <a:p>
+            <a:r>
+              <a:rPr lang="en-US" dirty="0">
+                <a:hlinkClick r:id="rId5"/>
+              </a:rPr>
+              <a:t>https://santamonica.gov/</a:t>
+            </a:r>
+            <a:endParaRPr lang="en-US" dirty="0"/>
+          </a:p>
+          <a:p>
+            <a:r>
+              <a:rPr lang="en-US" dirty="0">
+                <a:hlinkClick r:id="rId6"/>
+              </a:rPr>
+              <a:t>https://folkways.si.edu/</a:t>
+            </a:r>
+            <a:endParaRPr lang="en-US" dirty="0"/>
+          </a:p>
+          <a:p>
+            <a:r>
+              <a:rPr lang="en-US" dirty="0">
+                <a:hlinkClick r:id="rId7"/>
+              </a:rPr>
+              <a:t>https://esd.wa.gov/</a:t>
+            </a:r>
+            <a:endParaRPr lang="en-US" dirty="0"/>
+          </a:p>
+          <a:p>
+            <a:r>
               <a:rPr lang="en-US" dirty="0"/>
-              <a:t>www.playtfr.com</a:t>
-            </a:r>
-          </a:p>
-          <a:p>
+              <a:t>Also see </a:t>
+            </a:r>
+            <a:r>
+              <a:rPr lang="en-US" dirty="0">
+                <a:hlinkClick r:id="rId8"/>
+              </a:rPr>
+              <a:t>https://showorchard.com/</a:t>
+            </a:r>
             <a:r>
               <a:rPr lang="en-US" dirty="0"/>
-              <a:t>www.rvc.ac.uk</a:t>
-            </a:r>
-          </a:p>
-          <a:p>
-            <a:r>
-              <a:rPr lang="en-US" dirty="0"/>
-              <a:t>fly.eg</a:t>
-            </a:r>
-          </a:p>
-          <a:p>
-            <a:r>
-              <a:rPr lang="en-US" dirty="0"/>
-              <a:t>www.houseofblues.com</a:t>
-            </a:r>
-          </a:p>
-          <a:p>
-            <a:r>
-              <a:rPr lang="en-US" dirty="0"/>
-              <a:t>santamonica.gov</a:t>
-            </a:r>
-          </a:p>
-          <a:p>
-            <a:r>
-              <a:rPr lang="en-US" dirty="0"/>
-              <a:t>folkways.si.edu</a:t>
-            </a:r>
-          </a:p>
-          <a:p>
-            <a:r>
-              <a:rPr lang="en-US" dirty="0"/>
-              <a:t>esd.wa.gov</a:t>
-            </a:r>
-          </a:p>
-          <a:p>
-            <a:r>
-              <a:rPr lang="en-US" dirty="0"/>
-              <a:t>Also see showorchard.com</a:t>
+              <a:t> </a:t>
             </a:r>
           </a:p>
         </p:txBody>
@@ -5099,7 +5127,7 @@
     </p:spTree>
     <p:extLst>
       <p:ext uri="{BB962C8B-B14F-4D97-AF65-F5344CB8AC3E}">
-        <p14:creationId xmlns:p14="http://schemas.microsoft.com/office/powerpoint/2010/main" val="1155174393"/>
+        <p14:creationId xmlns:p14="http://schemas.microsoft.com/office/powerpoint/2010/main" val="2821261628"/>
       </p:ext>
     </p:extLst>
   </p:cSld>
@@ -5264,7 +5292,17 @@
           <a:p>
             <a:r>
               <a:rPr lang="en-US" dirty="0"/>
-              <a:t>DotNest SaaS (dotnest.com)</a:t>
+              <a:t>DotNest SaaS (</a:t>
+            </a:r>
+            <a:r>
+              <a:rPr lang="en-US" dirty="0">
+                <a:hlinkClick r:id="rId3"/>
+              </a:rPr>
+              <a:t>https://dotnest.com/</a:t>
+            </a:r>
+            <a:r>
+              <a:rPr lang="en-US" dirty="0"/>
+              <a:t>)</a:t>
             </a:r>
           </a:p>
         </p:txBody>
@@ -5272,7 +5310,7 @@
     </p:spTree>
     <p:extLst>
       <p:ext uri="{BB962C8B-B14F-4D97-AF65-F5344CB8AC3E}">
-        <p14:creationId xmlns:p14="http://schemas.microsoft.com/office/powerpoint/2010/main" val="2196499456"/>
+        <p14:creationId xmlns:p14="http://schemas.microsoft.com/office/powerpoint/2010/main" val="794973815"/>
       </p:ext>
     </p:extLst>
   </p:cSld>
@@ -5349,15 +5387,23 @@
           <a:lstStyle/>
           <a:p>
             <a:r>
+              <a:rPr lang="en-US" dirty="0">
+                <a:hlinkClick r:id="rId3"/>
+              </a:rPr>
+              <a:t>https://orchardcore.net/</a:t>
+            </a:r>
+            <a:endParaRPr lang="en-US" dirty="0"/>
+          </a:p>
+          <a:p>
+            <a:r>
+              <a:rPr lang="en-US" dirty="0">
+                <a:hlinkClick r:id="rId4"/>
+              </a:rPr>
+              <a:t>https://orcharddojo.net/</a:t>
+            </a:r>
+            <a:r>
               <a:rPr lang="en-US" dirty="0"/>
-              <a:t>orchardcore.net</a:t>
-            </a:r>
-            <a:endParaRPr lang="hu-HU" dirty="0"/>
-          </a:p>
-          <a:p>
-            <a:r>
-              <a:rPr lang="en-US" dirty="0"/>
-              <a:t>orcharddojo.net (newsletter</a:t>
+              <a:t> (newsletter</a:t>
             </a:r>
             <a:r>
               <a:rPr lang="hu-HU" dirty="0"/>
@@ -5376,21 +5422,17 @@
               <a:t>Course</a:t>
             </a:r>
             <a:r>
-              <a:rPr lang="en-US"/>
+              <a:rPr lang="en-US" dirty="0"/>
               <a:t> 3)</a:t>
             </a:r>
-            <a:endParaRPr lang="en-US" dirty="0"/>
-          </a:p>
-          <a:p>
-            <a:r>
-              <a:rPr lang="en-US" dirty="0"/>
-              <a:t>github.com/Lombiq/Orchard-Training-Demo-Module</a:t>
-            </a:r>
-          </a:p>
-          <a:p>
-            <a:pPr marL="0" indent="0">
-              <a:buNone/>
-            </a:pPr>
+          </a:p>
+          <a:p>
+            <a:r>
+              <a:rPr lang="en-US" dirty="0">
+                <a:hlinkClick r:id="rId5"/>
+              </a:rPr>
+              <a:t>https://github.com/Lombiq/Orchard-Training-Demo-Module</a:t>
+            </a:r>
             <a:endParaRPr lang="en-US" dirty="0"/>
           </a:p>
         </p:txBody>
@@ -5398,7 +5440,7 @@
     </p:spTree>
     <p:extLst>
       <p:ext uri="{BB962C8B-B14F-4D97-AF65-F5344CB8AC3E}">
-        <p14:creationId xmlns:p14="http://schemas.microsoft.com/office/powerpoint/2010/main" val="2327629"/>
+        <p14:creationId xmlns:p14="http://schemas.microsoft.com/office/powerpoint/2010/main" val="1544409723"/>
       </p:ext>
     </p:extLst>
   </p:cSld>

</xml_diff>

<commit_message>
Updating numbers in the PPT
</commit_message>
<xml_diff>
--- a/IntroductoryTalkTemplate/Showcasing Orchard Core CMS.pptx
+++ b/IntroductoryTalkTemplate/Showcasing Orchard Core CMS.pptx
@@ -262,7 +262,7 @@
           <a:p>
             <a:fld id="{E4359F16-E075-46EA-9430-278A6D2F0D2B}" type="datetimeFigureOut">
               <a:rPr lang="en-US" smtClean="0"/>
-              <a:t>5/16/2023</a:t>
+              <a:t>8/22/2023</a:t>
             </a:fld>
             <a:endParaRPr lang="en-US"/>
           </a:p>
@@ -1835,7 +1835,7 @@
           <a:p>
             <a:fld id="{20A66C5D-9C61-42DD-99EE-FB9C623F065C}" type="datetimeFigureOut">
               <a:rPr lang="en-US" smtClean="0"/>
-              <a:t>5/16/2023</a:t>
+              <a:t>8/22/2023</a:t>
             </a:fld>
             <a:endParaRPr lang="en-US"/>
           </a:p>
@@ -2033,7 +2033,7 @@
           <a:p>
             <a:fld id="{20A66C5D-9C61-42DD-99EE-FB9C623F065C}" type="datetimeFigureOut">
               <a:rPr lang="en-US" smtClean="0"/>
-              <a:t>5/16/2023</a:t>
+              <a:t>8/22/2023</a:t>
             </a:fld>
             <a:endParaRPr lang="en-US"/>
           </a:p>
@@ -2241,7 +2241,7 @@
           <a:p>
             <a:fld id="{20A66C5D-9C61-42DD-99EE-FB9C623F065C}" type="datetimeFigureOut">
               <a:rPr lang="en-US" smtClean="0"/>
-              <a:t>5/16/2023</a:t>
+              <a:t>8/22/2023</a:t>
             </a:fld>
             <a:endParaRPr lang="en-US"/>
           </a:p>
@@ -2439,7 +2439,7 @@
           <a:p>
             <a:fld id="{20A66C5D-9C61-42DD-99EE-FB9C623F065C}" type="datetimeFigureOut">
               <a:rPr lang="en-US" smtClean="0"/>
-              <a:t>5/16/2023</a:t>
+              <a:t>8/22/2023</a:t>
             </a:fld>
             <a:endParaRPr lang="en-US"/>
           </a:p>
@@ -2714,7 +2714,7 @@
           <a:p>
             <a:fld id="{20A66C5D-9C61-42DD-99EE-FB9C623F065C}" type="datetimeFigureOut">
               <a:rPr lang="en-US" smtClean="0"/>
-              <a:t>5/16/2023</a:t>
+              <a:t>8/22/2023</a:t>
             </a:fld>
             <a:endParaRPr lang="en-US"/>
           </a:p>
@@ -2979,7 +2979,7 @@
           <a:p>
             <a:fld id="{20A66C5D-9C61-42DD-99EE-FB9C623F065C}" type="datetimeFigureOut">
               <a:rPr lang="en-US" smtClean="0"/>
-              <a:t>5/16/2023</a:t>
+              <a:t>8/22/2023</a:t>
             </a:fld>
             <a:endParaRPr lang="en-US"/>
           </a:p>
@@ -3391,7 +3391,7 @@
           <a:p>
             <a:fld id="{20A66C5D-9C61-42DD-99EE-FB9C623F065C}" type="datetimeFigureOut">
               <a:rPr lang="en-US" smtClean="0"/>
-              <a:t>5/16/2023</a:t>
+              <a:t>8/22/2023</a:t>
             </a:fld>
             <a:endParaRPr lang="en-US"/>
           </a:p>
@@ -3532,7 +3532,7 @@
           <a:p>
             <a:fld id="{20A66C5D-9C61-42DD-99EE-FB9C623F065C}" type="datetimeFigureOut">
               <a:rPr lang="en-US" smtClean="0"/>
-              <a:t>5/16/2023</a:t>
+              <a:t>8/22/2023</a:t>
             </a:fld>
             <a:endParaRPr lang="en-US"/>
           </a:p>
@@ -3645,7 +3645,7 @@
           <a:p>
             <a:fld id="{20A66C5D-9C61-42DD-99EE-FB9C623F065C}" type="datetimeFigureOut">
               <a:rPr lang="en-US" smtClean="0"/>
-              <a:t>5/16/2023</a:t>
+              <a:t>8/22/2023</a:t>
             </a:fld>
             <a:endParaRPr lang="en-US"/>
           </a:p>
@@ -3956,7 +3956,7 @@
           <a:p>
             <a:fld id="{20A66C5D-9C61-42DD-99EE-FB9C623F065C}" type="datetimeFigureOut">
               <a:rPr lang="en-US" smtClean="0"/>
-              <a:t>5/16/2023</a:t>
+              <a:t>8/22/2023</a:t>
             </a:fld>
             <a:endParaRPr lang="en-US"/>
           </a:p>
@@ -4244,7 +4244,7 @@
           <a:p>
             <a:fld id="{20A66C5D-9C61-42DD-99EE-FB9C623F065C}" type="datetimeFigureOut">
               <a:rPr lang="en-US" smtClean="0"/>
-              <a:t>5/16/2023</a:t>
+              <a:t>8/22/2023</a:t>
             </a:fld>
             <a:endParaRPr lang="en-US"/>
           </a:p>
@@ -4485,7 +4485,7 @@
           <a:p>
             <a:fld id="{20A66C5D-9C61-42DD-99EE-FB9C623F065C}" type="datetimeFigureOut">
               <a:rPr lang="en-US" smtClean="0"/>
-              <a:t>5/16/2023</a:t>
+              <a:t>8/22/2023</a:t>
             </a:fld>
             <a:endParaRPr lang="en-US"/>
           </a:p>
@@ -5818,7 +5818,7 @@
               <a:rPr lang="en-US" dirty="0">
                 <a:cs typeface="Calibri"/>
               </a:rPr>
-              <a:t>67</a:t>
+              <a:t>69</a:t>
             </a:r>
             <a:r>
               <a:rPr lang="hu-HU" dirty="0">
@@ -5842,7 +5842,7 @@
               <a:rPr lang="en-US" dirty="0">
                 <a:cs typeface="Calibri"/>
               </a:rPr>
-              <a:t>240</a:t>
+              <a:t>250</a:t>
             </a:r>
             <a:r>
               <a:rPr lang="hu-HU" dirty="0">
@@ -5866,7 +5866,7 @@
               <a:rPr lang="en-US" dirty="0">
                 <a:cs typeface="Calibri"/>
               </a:rPr>
-              <a:t>60</a:t>
+              <a:t>61</a:t>
             </a:r>
             <a:r>
               <a:rPr lang="hu-HU" dirty="0">
@@ -5890,7 +5890,7 @@
               <a:rPr lang="en-US" dirty="0">
                 <a:cs typeface="Calibri"/>
               </a:rPr>
-              <a:t>48</a:t>
+              <a:t>49</a:t>
             </a:r>
             <a:r>
               <a:rPr lang="hu-HU" dirty="0">
@@ -6014,15 +6014,7 @@
             </a:r>
             <a:r>
               <a:rPr lang="en-US" dirty="0"/>
-              <a:t> contributors, 7</a:t>
-            </a:r>
-            <a:r>
-              <a:rPr lang="hu-HU" dirty="0"/>
-              <a:t>3</a:t>
-            </a:r>
-            <a:r>
-              <a:rPr lang="en-US" dirty="0"/>
-              <a:t>00 issues (5500 closed)</a:t>
+              <a:t> contributors, 7400 issues (5500 closed)</a:t>
             </a:r>
           </a:p>
           <a:p>

</xml_diff>

<commit_message>
OC is now .NET 8
</commit_message>
<xml_diff>
--- a/IntroductoryTalkTemplate/Showcasing Orchard Core CMS.pptx
+++ b/IntroductoryTalkTemplate/Showcasing Orchard Core CMS.pptx
@@ -5791,11 +5791,19 @@
           <a:p>
             <a:r>
               <a:rPr lang="en-US" dirty="0"/>
-              <a:t>.NET 6/7</a:t>
+              <a:t>.</a:t>
+            </a:r>
+            <a:r>
+              <a:rPr lang="en-US"/>
+              <a:t>NET 8</a:t>
+            </a:r>
+            <a:r>
+              <a:rPr lang="hu-HU"/>
+              <a:t>, </a:t>
             </a:r>
             <a:r>
               <a:rPr lang="hu-HU" dirty="0"/>
-              <a:t>, ASP.NET </a:t>
+              <a:t>ASP.NET </a:t>
             </a:r>
             <a:r>
               <a:rPr lang="en-US" dirty="0"/>

</xml_diff>